<commit_message>
update publications.html and status.html
</commit_message>
<xml_diff>
--- a/publication/NSLab_template.pptx
+++ b/publication/NSLab_template.pptx
@@ -5,21 +5,19 @@
     <p:sldMasterId id="2147483671" r:id="rId1"/>
   </p:sldMasterIdLst>
   <p:notesMasterIdLst>
-    <p:notesMasterId r:id="rId6"/>
+    <p:notesMasterId r:id="rId4"/>
   </p:notesMasterIdLst>
   <p:handoutMasterIdLst>
-    <p:handoutMasterId r:id="rId7"/>
+    <p:handoutMasterId r:id="rId5"/>
   </p:handoutMasterIdLst>
   <p:sldIdLst>
     <p:sldId id="340" r:id="rId2"/>
-    <p:sldId id="361" r:id="rId3"/>
-    <p:sldId id="341" r:id="rId4"/>
-    <p:sldId id="362" r:id="rId5"/>
+    <p:sldId id="339" r:id="rId3"/>
   </p:sldIdLst>
   <p:sldSz cx="9144000" cy="6858000" type="screen4x3"/>
   <p:notesSz cx="6858000" cy="9144000"/>
   <p:custDataLst>
-    <p:tags r:id="rId8"/>
+    <p:tags r:id="rId6"/>
   </p:custDataLst>
   <p:defaultTextStyle>
     <a:defPPr>
@@ -232,7 +230,7 @@
             <a:fld id="{89B989B6-2ED1-48B7-B8A8-561273AF83D2}" type="datetimeFigureOut">
               <a:rPr lang="zh-CN" altLang="en-US" smtClean="0"/>
               <a:pPr/>
-              <a:t>2010/9/23</a:t>
+              <a:t>2010/8/3</a:t>
             </a:fld>
             <a:endParaRPr lang="zh-CN" altLang="en-US"/>
           </a:p>
@@ -818,9 +816,6 @@
           <a:lstStyle>
             <a:lvl1pPr algn="ctr">
               <a:defRPr sz="4400">
-                <a:solidFill>
-                  <a:schemeClr val="tx1"/>
-                </a:solidFill>
                 <a:latin typeface="Georgia" pitchFamily="18" charset="0"/>
                 <a:ea typeface="黑体" pitchFamily="49" charset="-122"/>
                 <a:cs typeface="David" pitchFamily="34" charset="-79"/>
@@ -883,7 +878,7 @@
         </p:nvSpPr>
         <p:spPr bwMode="auto">
           <a:xfrm>
-            <a:off x="6731645" y="4859868"/>
+            <a:off x="6731645" y="4181018"/>
             <a:ext cx="2088232" cy="360040"/>
           </a:xfrm>
           <a:prstGeom prst="rect">
@@ -918,7 +913,7 @@
         </p:nvSpPr>
         <p:spPr bwMode="auto">
           <a:xfrm>
-            <a:off x="5147469" y="4859868"/>
+            <a:off x="5147469" y="4181018"/>
             <a:ext cx="1531937" cy="369332"/>
           </a:xfrm>
           <a:prstGeom prst="rect">
@@ -940,25 +935,37 @@
           <a:lstStyle/>
           <a:p>
             <a:r>
-              <a:rPr lang="en-US" altLang="zh-CN" sz="1800" b="0" i="1" dirty="0" smtClean="0">
+              <a:rPr lang="en-US" altLang="zh-CN" sz="1800" b="0" dirty="0" smtClean="0">
                 <a:solidFill>
                   <a:schemeClr val="tx1">
                     <a:lumMod val="75000"/>
                     <a:lumOff val="25000"/>
                   </a:schemeClr>
                 </a:solidFill>
-                <a:latin typeface="+mn-lt"/>
+                <a:latin typeface="+mj-lt"/>
               </a:rPr>
-              <a:t>Presented by</a:t>
-            </a:r>
-            <a:endParaRPr lang="en-US" altLang="zh-CN" sz="1800" b="0" i="1" dirty="0">
+              <a:t>Presented </a:t>
+            </a:r>
+            <a:r>
+              <a:rPr lang="en-US" altLang="zh-CN" sz="1800" b="0" dirty="0" smtClean="0">
+                <a:solidFill>
+                  <a:schemeClr val="tx1">
+                    <a:lumMod val="75000"/>
+                    <a:lumOff val="25000"/>
+                  </a:schemeClr>
+                </a:solidFill>
+                <a:latin typeface="+mj-lt"/>
+              </a:rPr>
+              <a:t>by</a:t>
+            </a:r>
+            <a:endParaRPr lang="en-US" altLang="zh-CN" sz="1800" b="0" dirty="0">
               <a:solidFill>
                 <a:schemeClr val="tx1">
                   <a:lumMod val="75000"/>
                   <a:lumOff val="25000"/>
                 </a:schemeClr>
               </a:solidFill>
-              <a:latin typeface="+mn-lt"/>
+              <a:latin typeface="+mj-lt"/>
             </a:endParaRPr>
           </a:p>
         </p:txBody>
@@ -973,7 +980,7 @@
         </p:nvSpPr>
         <p:spPr bwMode="auto">
           <a:xfrm>
-            <a:off x="5147469" y="4845554"/>
+            <a:off x="5147469" y="4166704"/>
             <a:ext cx="3649662" cy="360363"/>
           </a:xfrm>
           <a:prstGeom prst="rect">
@@ -1101,8 +1108,8 @@
         </p:nvCxnSpPr>
         <p:spPr bwMode="auto">
           <a:xfrm>
-            <a:off x="4788024" y="908720"/>
-            <a:ext cx="3960440" cy="0"/>
+            <a:off x="4860032" y="908720"/>
+            <a:ext cx="3979321" cy="19164"/>
           </a:xfrm>
           <a:prstGeom prst="line">
             <a:avLst/>
@@ -1450,19 +1457,10 @@
         <p:spPr/>
         <p:txBody>
           <a:bodyPr/>
-          <a:lstStyle>
-            <a:lvl1pPr>
-              <a:defRPr b="0">
-                <a:solidFill>
-                  <a:schemeClr val="tx1"/>
-                </a:solidFill>
-                <a:latin typeface="Impact" pitchFamily="34" charset="0"/>
-              </a:defRPr>
-            </a:lvl1pPr>
-          </a:lstStyle>
-          <a:p>
-            <a:r>
-              <a:rPr lang="en-US" altLang="zh-CN" dirty="0" smtClean="0"/>
+          <a:lstStyle/>
+          <a:p>
+            <a:r>
+              <a:rPr lang="en-US" altLang="zh-CN" smtClean="0"/>
               <a:t>Click to edit Master title style</a:t>
             </a:r>
             <a:endParaRPr lang="zh-CN" altLang="en-US" dirty="0"/>
@@ -1482,65 +1480,39 @@
         <p:spPr/>
         <p:txBody>
           <a:bodyPr/>
-          <a:lstStyle>
-            <a:lvl1pPr>
-              <a:buFont typeface="Wingdings" pitchFamily="2" charset="2"/>
-              <a:buChar char="u"/>
-              <a:defRPr/>
-            </a:lvl1pPr>
-            <a:lvl2pPr>
-              <a:buFont typeface="Arial" pitchFamily="34" charset="0"/>
-              <a:buChar char="•"/>
-              <a:defRPr/>
-            </a:lvl2pPr>
-            <a:lvl3pPr>
-              <a:buFontTx/>
-              <a:buNone/>
-              <a:defRPr/>
-            </a:lvl3pPr>
-            <a:lvl4pPr>
-              <a:buFontTx/>
-              <a:buNone/>
-              <a:defRPr/>
-            </a:lvl4pPr>
-            <a:lvl5pPr>
-              <a:buFontTx/>
-              <a:buNone/>
-              <a:defRPr/>
-            </a:lvl5pPr>
-          </a:lstStyle>
+          <a:lstStyle/>
           <a:p>
             <a:pPr lvl="0"/>
             <a:r>
-              <a:rPr lang="en-US" altLang="zh-CN" dirty="0" smtClean="0"/>
+              <a:rPr lang="en-US" altLang="zh-CN" smtClean="0"/>
               <a:t>Click to edit Master text styles</a:t>
             </a:r>
           </a:p>
           <a:p>
             <a:pPr lvl="1"/>
             <a:r>
-              <a:rPr lang="en-US" altLang="zh-CN" dirty="0" smtClean="0"/>
+              <a:rPr lang="en-US" altLang="zh-CN" smtClean="0"/>
               <a:t>Second level</a:t>
             </a:r>
           </a:p>
           <a:p>
             <a:pPr lvl="2"/>
             <a:r>
-              <a:rPr lang="en-US" altLang="zh-CN" dirty="0" smtClean="0"/>
+              <a:rPr lang="en-US" altLang="zh-CN" smtClean="0"/>
               <a:t>Third level</a:t>
             </a:r>
           </a:p>
           <a:p>
             <a:pPr lvl="3"/>
             <a:r>
-              <a:rPr lang="en-US" altLang="zh-CN" dirty="0" smtClean="0"/>
+              <a:rPr lang="en-US" altLang="zh-CN" smtClean="0"/>
               <a:t>Fourth level</a:t>
             </a:r>
           </a:p>
           <a:p>
             <a:pPr lvl="4"/>
             <a:r>
-              <a:rPr lang="en-US" altLang="zh-CN" dirty="0" smtClean="0"/>
+              <a:rPr lang="en-US" altLang="zh-CN" smtClean="0"/>
               <a:t>Fifth level</a:t>
             </a:r>
             <a:endParaRPr lang="zh-CN" altLang="en-US" dirty="0"/>
@@ -2794,6 +2766,53 @@
       </p:grpSpPr>
       <p:sp>
         <p:nvSpPr>
+          <p:cNvPr id="68643" name="AutoShape 35"/>
+          <p:cNvSpPr>
+            <a:spLocks noChangeArrowheads="1"/>
+          </p:cNvSpPr>
+          <p:nvPr/>
+        </p:nvSpPr>
+        <p:spPr bwMode="auto">
+          <a:xfrm>
+            <a:off x="762000" y="762000"/>
+            <a:ext cx="5105400" cy="609600"/>
+          </a:xfrm>
+          <a:prstGeom prst="roundRect">
+            <a:avLst>
+              <a:gd name="adj" fmla="val 50000"/>
+            </a:avLst>
+          </a:prstGeom>
+          <a:solidFill>
+            <a:schemeClr val="bg1"/>
+          </a:solidFill>
+          <a:ln w="9525">
+            <a:noFill/>
+            <a:round/>
+            <a:headEnd/>
+            <a:tailEnd/>
+          </a:ln>
+          <a:effectLst/>
+        </p:spPr>
+        <p:txBody>
+          <a:bodyPr wrap="none" anchor="ctr"/>
+          <a:lstStyle/>
+          <a:p>
+            <a:pPr>
+              <a:spcBef>
+                <a:spcPct val="0"/>
+              </a:spcBef>
+            </a:pPr>
+            <a:endParaRPr kumimoji="1" lang="zh-CN" altLang="en-US">
+              <a:solidFill>
+                <a:schemeClr val="tx1"/>
+              </a:solidFill>
+              <a:ea typeface="宋体" charset="-122"/>
+            </a:endParaRPr>
+          </a:p>
+        </p:txBody>
+      </p:sp>
+      <p:sp>
+        <p:nvSpPr>
           <p:cNvPr id="68644" name="Rectangle 36"/>
           <p:cNvSpPr>
             <a:spLocks noGrp="1" noChangeArrowheads="1"/>
@@ -3040,9 +3059,7 @@
             <a:r>
               <a:rPr lang="en-US" sz="1800" b="0" i="1" dirty="0" smtClean="0">
                 <a:solidFill>
-                  <a:srgbClr val="0000FF">
-                    <a:alpha val="38000"/>
-                  </a:srgbClr>
+                  <a:srgbClr val="0000FF"/>
                 </a:solidFill>
                 <a:latin typeface="Bernard MT Condensed" pitchFamily="18" charset="0"/>
                 <a:ea typeface="微软雅黑" pitchFamily="34" charset="-122"/>
@@ -3052,9 +3069,7 @@
             <a:r>
               <a:rPr lang="en-US" sz="1200" b="0" i="1" dirty="0" smtClean="0">
                 <a:solidFill>
-                  <a:srgbClr val="0000FF">
-                    <a:alpha val="38000"/>
-                  </a:srgbClr>
+                  <a:srgbClr val="0000FF"/>
                 </a:solidFill>
                 <a:latin typeface="Bernard MT Condensed" pitchFamily="18" charset="0"/>
                 <a:ea typeface="微软雅黑" pitchFamily="34" charset="-122"/>
@@ -3066,7 +3081,6 @@
                 <a:solidFill>
                   <a:schemeClr val="bg1">
                     <a:lumMod val="50000"/>
-                    <a:alpha val="65000"/>
                   </a:schemeClr>
                 </a:solidFill>
                 <a:latin typeface="+mn-lt"/>
@@ -3077,9 +3091,7 @@
             <a:r>
               <a:rPr lang="en-US" sz="1600" b="0" dirty="0" smtClean="0">
                 <a:solidFill>
-                  <a:srgbClr val="990099">
-                    <a:alpha val="38000"/>
-                  </a:srgbClr>
+                  <a:srgbClr val="990099"/>
                 </a:solidFill>
                 <a:latin typeface="Century" pitchFamily="18" charset="0"/>
                 <a:ea typeface="微软雅黑" pitchFamily="34" charset="-122"/>
@@ -3095,6 +3107,36 @@
               <a:latin typeface="Lucida Bright" pitchFamily="18" charset="0"/>
               <a:ea typeface="黑体" pitchFamily="2" charset="-122"/>
             </a:endParaRPr>
+          </a:p>
+        </p:txBody>
+      </p:sp>
+      <p:sp>
+        <p:nvSpPr>
+          <p:cNvPr id="11" name="TextBox 10"/>
+          <p:cNvSpPr txBox="1"/>
+          <p:nvPr userDrawn="1"/>
+        </p:nvSpPr>
+        <p:spPr>
+          <a:xfrm>
+            <a:off x="2987824" y="6525344"/>
+            <a:ext cx="4032448" cy="338554"/>
+          </a:xfrm>
+          <a:prstGeom prst="rect">
+            <a:avLst/>
+          </a:prstGeom>
+          <a:solidFill>
+            <a:schemeClr val="bg1">
+              <a:alpha val="70000"/>
+            </a:schemeClr>
+          </a:solidFill>
+        </p:spPr>
+        <p:txBody>
+          <a:bodyPr wrap="square" rtlCol="0">
+            <a:spAutoFit/>
+          </a:bodyPr>
+          <a:lstStyle/>
+          <a:p>
+            <a:endParaRPr lang="en-US" sz="1600" dirty="0"/>
           </a:p>
         </p:txBody>
       </p:sp>
@@ -3131,11 +3173,13 @@
         <a:spcAft>
           <a:spcPct val="0"/>
         </a:spcAft>
-        <a:defRPr sz="3600" b="0">
+        <a:defRPr sz="3600" b="1">
           <a:solidFill>
-            <a:schemeClr val="tx1"/>
+            <a:schemeClr val="tx2">
+              <a:lumMod val="75000"/>
+            </a:schemeClr>
           </a:solidFill>
-          <a:latin typeface="Impact" pitchFamily="34" charset="0"/>
+          <a:latin typeface="微软雅黑" pitchFamily="34" charset="-122"/>
           <a:ea typeface="微软雅黑" pitchFamily="34" charset="-122"/>
           <a:cs typeface="+mj-cs"/>
         </a:defRPr>
@@ -3585,56 +3629,14 @@
         </p:nvSpPr>
         <p:spPr/>
         <p:txBody>
-          <a:bodyPr>
-            <a:noAutofit/>
-          </a:bodyPr>
+          <a:bodyPr/>
           <a:lstStyle/>
           <a:p>
             <a:r>
-              <a:rPr lang="en-US" altLang="zh-CN" i="1" dirty="0" err="1" smtClean="0">
-                <a:solidFill>
-                  <a:schemeClr val="tx1"/>
-                </a:solidFill>
-              </a:rPr>
-              <a:t>NSLab</a:t>
-            </a:r>
-            <a:r>
-              <a:rPr lang="en-US" altLang="zh-CN" i="1" dirty="0" smtClean="0">
-                <a:solidFill>
-                  <a:schemeClr val="tx1"/>
-                </a:solidFill>
-              </a:rPr>
-              <a:t>: </a:t>
-            </a:r>
-            <a:r>
-              <a:rPr lang="en-US" altLang="zh-CN" sz="3200" dirty="0" smtClean="0">
-                <a:solidFill>
-                  <a:schemeClr val="tx1"/>
-                </a:solidFill>
-              </a:rPr>
-              <a:t>Network Security Laboratory of </a:t>
-            </a:r>
-            <a:r>
-              <a:rPr lang="en-US" altLang="zh-CN" sz="3200" dirty="0" err="1" smtClean="0">
-                <a:solidFill>
-                  <a:schemeClr val="tx1"/>
-                </a:solidFill>
-              </a:rPr>
-              <a:t>Tsinghua</a:t>
-            </a:r>
-            <a:r>
-              <a:rPr lang="en-US" altLang="zh-CN" sz="3200" dirty="0" smtClean="0">
-                <a:solidFill>
-                  <a:schemeClr val="tx1"/>
-                </a:solidFill>
-              </a:rPr>
-              <a:t> University, Beijing, China</a:t>
-            </a:r>
-            <a:endParaRPr lang="en-US" sz="3200" dirty="0">
-              <a:solidFill>
-                <a:schemeClr val="tx1"/>
-              </a:solidFill>
-            </a:endParaRPr>
+              <a:rPr lang="en-US" altLang="zh-CN" dirty="0" smtClean="0"/>
+              <a:t>Presentation Template</a:t>
+            </a:r>
+            <a:endParaRPr lang="en-US" dirty="0"/>
           </a:p>
         </p:txBody>
       </p:sp>
@@ -3646,7 +3648,7 @@
         </p:nvSpPr>
         <p:spPr>
           <a:xfrm>
-            <a:off x="6732240" y="4757082"/>
+            <a:off x="6732240" y="4077072"/>
             <a:ext cx="2088232" cy="523220"/>
           </a:xfrm>
           <a:prstGeom prst="rect">
@@ -3663,20 +3665,14 @@
             <a:r>
               <a:rPr lang="en-US" sz="2800" i="1" dirty="0" smtClean="0">
                 <a:solidFill>
-                  <a:schemeClr val="tx1">
-                    <a:lumMod val="50000"/>
-                    <a:lumOff val="50000"/>
-                  </a:schemeClr>
+                  <a:schemeClr val="tx1"/>
                 </a:solidFill>
               </a:rPr>
-              <a:t>presenter</a:t>
+              <a:t>Your name</a:t>
             </a:r>
             <a:endParaRPr lang="en-US" sz="2800" i="1" dirty="0">
               <a:solidFill>
-                <a:schemeClr val="tx1">
-                  <a:lumMod val="50000"/>
-                  <a:lumOff val="50000"/>
-                </a:schemeClr>
+                <a:schemeClr val="tx1"/>
               </a:solidFill>
             </a:endParaRPr>
           </a:p>
@@ -3690,8 +3686,8 @@
         </p:nvSpPr>
         <p:spPr>
           <a:xfrm>
-            <a:off x="6588224" y="5405154"/>
-            <a:ext cx="2241319" cy="400110"/>
+            <a:off x="5940152" y="4941168"/>
+            <a:ext cx="2074607" cy="461665"/>
           </a:xfrm>
           <a:prstGeom prst="rect">
             <a:avLst/>
@@ -3705,7 +3701,7 @@
           <a:lstStyle/>
           <a:p>
             <a:fld id="{5CAE7B12-CD40-4AAA-96A7-8F6CB2CD0ACE}" type="datetime4">
-              <a:rPr lang="en-US" sz="2000" smtClean="0">
+              <a:rPr lang="en-US" smtClean="0">
                 <a:solidFill>
                   <a:schemeClr val="tx1">
                     <a:lumMod val="50000"/>
@@ -3714,7 +3710,7 @@
                 </a:solidFill>
               </a:rPr>
               <a:pPr/>
-              <a:t>September 23, 2010</a:t>
+              <a:t>August 3, 2010</a:t>
             </a:fld>
             <a:endParaRPr lang="en-US" dirty="0">
               <a:solidFill>
@@ -3723,97 +3719,6 @@
                   <a:lumOff val="50000"/>
                 </a:schemeClr>
               </a:solidFill>
-            </a:endParaRPr>
-          </a:p>
-        </p:txBody>
-      </p:sp>
-      <p:sp>
-        <p:nvSpPr>
-          <p:cNvPr id="5" name="Title 1"/>
-          <p:cNvSpPr txBox="1">
-            <a:spLocks/>
-          </p:cNvSpPr>
-          <p:nvPr/>
-        </p:nvSpPr>
-        <p:spPr bwMode="auto">
-          <a:xfrm>
-            <a:off x="1259632" y="3068960"/>
-            <a:ext cx="6912768" cy="430887"/>
-          </a:xfrm>
-          <a:prstGeom prst="rect">
-            <a:avLst/>
-          </a:prstGeom>
-          <a:noFill/>
-          <a:ln w="76200">
-            <a:noFill/>
-            <a:miter lim="800000"/>
-            <a:headEnd/>
-            <a:tailEnd/>
-          </a:ln>
-          <a:effectLst/>
-        </p:spPr>
-        <p:txBody>
-          <a:bodyPr vert="horz" wrap="square" lIns="91440" tIns="45720" rIns="91440" bIns="45720" numCol="1" anchor="ctr" anchorCtr="0" compatLnSpc="1">
-            <a:prstTxWarp prst="textNoShape">
-              <a:avLst/>
-            </a:prstTxWarp>
-            <a:normAutofit/>
-          </a:bodyPr>
-          <a:lstStyle/>
-          <a:p>
-            <a:pPr marL="0" marR="0" lvl="0" indent="0" algn="ctr" defTabSz="914400" rtl="0" eaLnBrk="1" fontAlgn="base" latinLnBrk="0" hangingPunct="1">
-              <a:lnSpc>
-                <a:spcPct val="100000"/>
-              </a:lnSpc>
-              <a:spcBef>
-                <a:spcPct val="0"/>
-              </a:spcBef>
-              <a:spcAft>
-                <a:spcPct val="0"/>
-              </a:spcAft>
-              <a:buClrTx/>
-              <a:buSzTx/>
-              <a:buFontTx/>
-              <a:buNone/>
-              <a:tabLst/>
-              <a:defRPr/>
-            </a:pPr>
-            <a:r>
-              <a:rPr kumimoji="0" lang="en-US" altLang="zh-CN" sz="2200" u="none" strike="noStrike" kern="0" cap="none" spc="0" normalizeH="0" baseline="0" noProof="0" dirty="0" smtClean="0">
-                <a:ln>
-                  <a:noFill/>
-                </a:ln>
-                <a:solidFill>
-                  <a:schemeClr val="tx1">
-                    <a:lumMod val="65000"/>
-                    <a:lumOff val="35000"/>
-                  </a:schemeClr>
-                </a:solidFill>
-                <a:effectLst/>
-                <a:uLnTx/>
-                <a:uFillTx/>
-                <a:latin typeface="+mn-lt"/>
-                <a:ea typeface="黑体" pitchFamily="49" charset="-122"/>
-                <a:cs typeface="David" pitchFamily="34" charset="-79"/>
-              </a:rPr>
-              <a:t>Authors name here</a:t>
-            </a:r>
-            <a:endParaRPr kumimoji="0" lang="en-US" sz="2200" u="none" strike="noStrike" kern="0" cap="none" spc="0" normalizeH="0" baseline="0" noProof="0" dirty="0">
-              <a:ln>
-                <a:noFill/>
-              </a:ln>
-              <a:solidFill>
-                <a:schemeClr val="tx1">
-                  <a:lumMod val="65000"/>
-                  <a:lumOff val="35000"/>
-                </a:schemeClr>
-              </a:solidFill>
-              <a:effectLst/>
-              <a:uLnTx/>
-              <a:uFillTx/>
-              <a:latin typeface="+mn-lt"/>
-              <a:ea typeface="黑体" pitchFamily="49" charset="-122"/>
-              <a:cs typeface="David" pitchFamily="34" charset="-79"/>
             </a:endParaRPr>
           </a:p>
         </p:txBody>
@@ -3853,9 +3758,9 @@
       </p:grpSpPr>
       <p:sp>
         <p:nvSpPr>
-          <p:cNvPr id="2" name="Title 1"/>
+          <p:cNvPr id="227330" name="Rectangle 2"/>
           <p:cNvSpPr>
-            <a:spLocks noGrp="1"/>
+            <a:spLocks noGrp="1" noChangeArrowheads="1"/>
           </p:cNvSpPr>
           <p:nvPr>
             <p:ph type="title"/>
@@ -3867,595 +3772,21 @@
           <a:lstStyle/>
           <a:p>
             <a:r>
-              <a:rPr lang="en-US" altLang="zh-CN" kern="1200" dirty="0" smtClean="0">
-                <a:latin typeface="Impact" pitchFamily="34" charset="0"/>
-                <a:cs typeface="+mn-cs"/>
-              </a:rPr>
+              <a:rPr lang="en-US" altLang="zh-CN" dirty="0" smtClean="0"/>
               <a:t>Content</a:t>
             </a:r>
-            <a:endParaRPr lang="zh-CN" altLang="en-US" sz="3200" kern="1200" dirty="0">
-              <a:latin typeface="Impact" pitchFamily="34" charset="0"/>
-              <a:cs typeface="+mn-cs"/>
-            </a:endParaRPr>
+            <a:endParaRPr lang="zh-CN" altLang="en-US" dirty="0"/>
           </a:p>
         </p:txBody>
       </p:sp>
       <p:sp>
         <p:nvSpPr>
-          <p:cNvPr id="4" name="Rectangle 3"/>
-          <p:cNvSpPr/>
-          <p:nvPr/>
-        </p:nvSpPr>
-        <p:spPr bwMode="auto">
-          <a:xfrm>
-            <a:off x="2771800" y="1916832"/>
-            <a:ext cx="457200" cy="457200"/>
-          </a:xfrm>
-          <a:prstGeom prst="rect">
-            <a:avLst/>
-          </a:prstGeom>
-          <a:solidFill>
-            <a:srgbClr val="FF0000"/>
-          </a:solidFill>
-          <a:ln w="9525" cap="flat" cmpd="sng" algn="ctr">
-            <a:noFill/>
-            <a:prstDash val="solid"/>
-            <a:round/>
-            <a:headEnd type="none" w="med" len="med"/>
-            <a:tailEnd type="none" w="med" len="med"/>
-          </a:ln>
-          <a:effectLst/>
-        </p:spPr>
-        <p:txBody>
-          <a:bodyPr vert="horz" wrap="none" lIns="91440" tIns="45720" rIns="91440" bIns="45720" numCol="1" rtlCol="0" anchor="ctr" anchorCtr="0" compatLnSpc="1">
-            <a:prstTxWarp prst="textNoShape">
-              <a:avLst/>
-            </a:prstTxWarp>
-          </a:bodyPr>
-          <a:lstStyle/>
-          <a:p>
-            <a:pPr marL="0" marR="0" indent="0" algn="ctr" defTabSz="914400" rtl="0" eaLnBrk="1" fontAlgn="base" latinLnBrk="0" hangingPunct="1">
-              <a:lnSpc>
-                <a:spcPct val="100000"/>
-              </a:lnSpc>
-              <a:spcBef>
-                <a:spcPct val="50000"/>
-              </a:spcBef>
-              <a:spcAft>
-                <a:spcPct val="0"/>
-              </a:spcAft>
-              <a:buClrTx/>
-              <a:buSzTx/>
-              <a:buFontTx/>
-              <a:buNone/>
-              <a:tabLst/>
-            </a:pPr>
-            <a:endParaRPr kumimoji="0" lang="zh-CN" altLang="en-US" sz="2800" b="0" i="0" u="none" strike="noStrike" cap="none" normalizeH="0" baseline="0" smtClean="0">
-              <a:ln>
-                <a:noFill/>
-              </a:ln>
-              <a:solidFill>
-                <a:srgbClr val="003300"/>
-              </a:solidFill>
-              <a:effectLst/>
-              <a:latin typeface="Times New Roman" pitchFamily="18" charset="0"/>
-              <a:ea typeface="幼圆" pitchFamily="49" charset="-122"/>
-            </a:endParaRPr>
-          </a:p>
-        </p:txBody>
-      </p:sp>
-      <p:cxnSp>
-        <p:nvCxnSpPr>
-          <p:cNvPr id="6" name="Straight Connector 5"/>
-          <p:cNvCxnSpPr/>
-          <p:nvPr/>
-        </p:nvCxnSpPr>
-        <p:spPr bwMode="auto">
-          <a:xfrm>
-            <a:off x="3144416" y="2348880"/>
-            <a:ext cx="2651720" cy="0"/>
-          </a:xfrm>
-          <a:prstGeom prst="line">
-            <a:avLst/>
-          </a:prstGeom>
-          <a:noFill/>
-          <a:ln w="9525" cap="flat" cmpd="sng" algn="ctr">
-            <a:solidFill>
-              <a:srgbClr val="FF0000"/>
-            </a:solidFill>
-            <a:prstDash val="solid"/>
-            <a:round/>
-            <a:headEnd type="none" w="med" len="med"/>
-            <a:tailEnd type="none" w="med" len="med"/>
-          </a:ln>
-          <a:effectLst/>
-        </p:spPr>
-      </p:cxnSp>
-      <p:sp>
-        <p:nvSpPr>
-          <p:cNvPr id="8" name="TextBox 7"/>
-          <p:cNvSpPr txBox="1"/>
-          <p:nvPr/>
-        </p:nvSpPr>
-        <p:spPr>
-          <a:xfrm>
-            <a:off x="3419872" y="1844824"/>
-            <a:ext cx="2232248" cy="584775"/>
-          </a:xfrm>
-          <a:prstGeom prst="rect">
-            <a:avLst/>
-          </a:prstGeom>
-          <a:noFill/>
-        </p:spPr>
-        <p:txBody>
-          <a:bodyPr wrap="square" rtlCol="0">
-            <a:spAutoFit/>
-          </a:bodyPr>
-          <a:lstStyle/>
-          <a:p>
-            <a:pPr algn="l"/>
-            <a:r>
-              <a:rPr lang="en-US" altLang="zh-CN" sz="3200" dirty="0" smtClean="0">
-                <a:solidFill>
-                  <a:schemeClr val="tx1"/>
-                </a:solidFill>
-                <a:latin typeface="Impact" pitchFamily="34" charset="0"/>
-                <a:ea typeface="微软雅黑" pitchFamily="34" charset="-122"/>
-              </a:rPr>
-              <a:t>Background</a:t>
-            </a:r>
-            <a:endParaRPr lang="zh-CN" altLang="en-US" sz="2800" dirty="0">
-              <a:latin typeface="Impact" pitchFamily="34" charset="0"/>
-              <a:ea typeface="微软雅黑" pitchFamily="34" charset="-122"/>
-            </a:endParaRPr>
-          </a:p>
-        </p:txBody>
-      </p:sp>
-      <p:sp>
-        <p:nvSpPr>
-          <p:cNvPr id="10" name="Rectangle 9"/>
-          <p:cNvSpPr/>
-          <p:nvPr/>
-        </p:nvSpPr>
-        <p:spPr bwMode="auto">
-          <a:xfrm>
-            <a:off x="2771800" y="2564904"/>
-            <a:ext cx="457200" cy="457200"/>
-          </a:xfrm>
-          <a:prstGeom prst="rect">
-            <a:avLst/>
-          </a:prstGeom>
-          <a:solidFill>
-            <a:srgbClr val="FF0000"/>
-          </a:solidFill>
-          <a:ln w="9525" cap="flat" cmpd="sng" algn="ctr">
-            <a:noFill/>
-            <a:prstDash val="solid"/>
-            <a:round/>
-            <a:headEnd type="none" w="med" len="med"/>
-            <a:tailEnd type="none" w="med" len="med"/>
-          </a:ln>
-          <a:effectLst/>
-        </p:spPr>
-        <p:txBody>
-          <a:bodyPr vert="horz" wrap="none" lIns="91440" tIns="45720" rIns="91440" bIns="45720" numCol="1" rtlCol="0" anchor="ctr" anchorCtr="0" compatLnSpc="1">
-            <a:prstTxWarp prst="textNoShape">
-              <a:avLst/>
-            </a:prstTxWarp>
-          </a:bodyPr>
-          <a:lstStyle/>
-          <a:p>
-            <a:pPr marL="0" marR="0" indent="0" algn="ctr" defTabSz="914400" rtl="0" eaLnBrk="1" fontAlgn="base" latinLnBrk="0" hangingPunct="1">
-              <a:lnSpc>
-                <a:spcPct val="100000"/>
-              </a:lnSpc>
-              <a:spcBef>
-                <a:spcPct val="50000"/>
-              </a:spcBef>
-              <a:spcAft>
-                <a:spcPct val="0"/>
-              </a:spcAft>
-              <a:buClrTx/>
-              <a:buSzTx/>
-              <a:buFontTx/>
-              <a:buNone/>
-              <a:tabLst/>
-            </a:pPr>
-            <a:endParaRPr kumimoji="0" lang="zh-CN" altLang="en-US" sz="2800" b="0" i="0" u="none" strike="noStrike" cap="none" normalizeH="0" baseline="0" smtClean="0">
-              <a:ln>
-                <a:noFill/>
-              </a:ln>
-              <a:solidFill>
-                <a:srgbClr val="003300"/>
-              </a:solidFill>
-              <a:effectLst/>
-              <a:latin typeface="Times New Roman" pitchFamily="18" charset="0"/>
-              <a:ea typeface="幼圆" pitchFamily="49" charset="-122"/>
-            </a:endParaRPr>
-          </a:p>
-        </p:txBody>
-      </p:sp>
-      <p:cxnSp>
-        <p:nvCxnSpPr>
-          <p:cNvPr id="11" name="Straight Connector 10"/>
-          <p:cNvCxnSpPr/>
-          <p:nvPr/>
-        </p:nvCxnSpPr>
-        <p:spPr bwMode="auto">
-          <a:xfrm>
-            <a:off x="3144416" y="2996952"/>
-            <a:ext cx="2651720" cy="0"/>
-          </a:xfrm>
-          <a:prstGeom prst="line">
-            <a:avLst/>
-          </a:prstGeom>
-          <a:noFill/>
-          <a:ln w="9525" cap="flat" cmpd="sng" algn="ctr">
-            <a:solidFill>
-              <a:srgbClr val="FF0000"/>
-            </a:solidFill>
-            <a:prstDash val="solid"/>
-            <a:round/>
-            <a:headEnd type="none" w="med" len="med"/>
-            <a:tailEnd type="none" w="med" len="med"/>
-          </a:ln>
-          <a:effectLst/>
-        </p:spPr>
-      </p:cxnSp>
-      <p:sp>
-        <p:nvSpPr>
-          <p:cNvPr id="12" name="TextBox 11"/>
-          <p:cNvSpPr txBox="1"/>
-          <p:nvPr/>
-        </p:nvSpPr>
-        <p:spPr>
-          <a:xfrm>
-            <a:off x="3419872" y="2492896"/>
-            <a:ext cx="2088232" cy="584775"/>
-          </a:xfrm>
-          <a:prstGeom prst="rect">
-            <a:avLst/>
-          </a:prstGeom>
-          <a:noFill/>
-        </p:spPr>
-        <p:txBody>
-          <a:bodyPr wrap="square" rtlCol="0">
-            <a:spAutoFit/>
-          </a:bodyPr>
-          <a:lstStyle/>
-          <a:p>
-            <a:pPr algn="l"/>
-            <a:r>
-              <a:rPr lang="en-US" altLang="zh-CN" sz="3200" dirty="0" smtClean="0">
-                <a:solidFill>
-                  <a:schemeClr val="tx1"/>
-                </a:solidFill>
-                <a:latin typeface="Impact" pitchFamily="34" charset="0"/>
-                <a:ea typeface="微软雅黑" pitchFamily="34" charset="-122"/>
-              </a:rPr>
-              <a:t>Design</a:t>
-            </a:r>
-            <a:endParaRPr lang="zh-CN" altLang="en-US" sz="2800" dirty="0">
-              <a:latin typeface="Impact" pitchFamily="34" charset="0"/>
-              <a:ea typeface="微软雅黑" pitchFamily="34" charset="-122"/>
-            </a:endParaRPr>
-          </a:p>
-        </p:txBody>
-      </p:sp>
-      <p:sp>
-        <p:nvSpPr>
-          <p:cNvPr id="14" name="Rectangle 13"/>
-          <p:cNvSpPr/>
-          <p:nvPr/>
-        </p:nvSpPr>
-        <p:spPr bwMode="auto">
-          <a:xfrm>
-            <a:off x="2771800" y="3212976"/>
-            <a:ext cx="457200" cy="457200"/>
-          </a:xfrm>
-          <a:prstGeom prst="rect">
-            <a:avLst/>
-          </a:prstGeom>
-          <a:solidFill>
-            <a:srgbClr val="FF0000"/>
-          </a:solidFill>
-          <a:ln w="9525" cap="flat" cmpd="sng" algn="ctr">
-            <a:noFill/>
-            <a:prstDash val="solid"/>
-            <a:round/>
-            <a:headEnd type="none" w="med" len="med"/>
-            <a:tailEnd type="none" w="med" len="med"/>
-          </a:ln>
-          <a:effectLst/>
-        </p:spPr>
-        <p:txBody>
-          <a:bodyPr vert="horz" wrap="none" lIns="91440" tIns="45720" rIns="91440" bIns="45720" numCol="1" rtlCol="0" anchor="ctr" anchorCtr="0" compatLnSpc="1">
-            <a:prstTxWarp prst="textNoShape">
-              <a:avLst/>
-            </a:prstTxWarp>
-          </a:bodyPr>
-          <a:lstStyle/>
-          <a:p>
-            <a:pPr marL="0" marR="0" indent="0" algn="ctr" defTabSz="914400" rtl="0" eaLnBrk="1" fontAlgn="base" latinLnBrk="0" hangingPunct="1">
-              <a:lnSpc>
-                <a:spcPct val="100000"/>
-              </a:lnSpc>
-              <a:spcBef>
-                <a:spcPct val="50000"/>
-              </a:spcBef>
-              <a:spcAft>
-                <a:spcPct val="0"/>
-              </a:spcAft>
-              <a:buClrTx/>
-              <a:buSzTx/>
-              <a:buFontTx/>
-              <a:buNone/>
-              <a:tabLst/>
-            </a:pPr>
-            <a:endParaRPr kumimoji="0" lang="zh-CN" altLang="en-US" sz="2800" b="0" i="0" u="none" strike="noStrike" cap="none" normalizeH="0" baseline="0" smtClean="0">
-              <a:ln>
-                <a:noFill/>
-              </a:ln>
-              <a:solidFill>
-                <a:srgbClr val="003300"/>
-              </a:solidFill>
-              <a:effectLst/>
-              <a:latin typeface="Times New Roman" pitchFamily="18" charset="0"/>
-              <a:ea typeface="幼圆" pitchFamily="49" charset="-122"/>
-            </a:endParaRPr>
-          </a:p>
-        </p:txBody>
-      </p:sp>
-      <p:cxnSp>
-        <p:nvCxnSpPr>
-          <p:cNvPr id="15" name="Straight Connector 14"/>
-          <p:cNvCxnSpPr/>
-          <p:nvPr/>
-        </p:nvCxnSpPr>
-        <p:spPr bwMode="auto">
-          <a:xfrm>
-            <a:off x="3144416" y="3645024"/>
-            <a:ext cx="2651720" cy="0"/>
-          </a:xfrm>
-          <a:prstGeom prst="line">
-            <a:avLst/>
-          </a:prstGeom>
-          <a:noFill/>
-          <a:ln w="9525" cap="flat" cmpd="sng" algn="ctr">
-            <a:solidFill>
-              <a:srgbClr val="FF0000"/>
-            </a:solidFill>
-            <a:prstDash val="solid"/>
-            <a:round/>
-            <a:headEnd type="none" w="med" len="med"/>
-            <a:tailEnd type="none" w="med" len="med"/>
-          </a:ln>
-          <a:effectLst/>
-        </p:spPr>
-      </p:cxnSp>
-      <p:sp>
-        <p:nvSpPr>
-          <p:cNvPr id="16" name="TextBox 15"/>
-          <p:cNvSpPr txBox="1"/>
-          <p:nvPr/>
-        </p:nvSpPr>
-        <p:spPr>
-          <a:xfrm>
-            <a:off x="3419872" y="3140968"/>
-            <a:ext cx="2088232" cy="584775"/>
-          </a:xfrm>
-          <a:prstGeom prst="rect">
-            <a:avLst/>
-          </a:prstGeom>
-          <a:noFill/>
-        </p:spPr>
-        <p:txBody>
-          <a:bodyPr wrap="square" rtlCol="0">
-            <a:spAutoFit/>
-          </a:bodyPr>
-          <a:lstStyle/>
-          <a:p>
-            <a:pPr algn="l"/>
-            <a:r>
-              <a:rPr lang="en-US" altLang="zh-CN" sz="3200" dirty="0" smtClean="0">
-                <a:solidFill>
-                  <a:schemeClr val="tx1"/>
-                </a:solidFill>
-                <a:latin typeface="Impact" pitchFamily="34" charset="0"/>
-                <a:ea typeface="微软雅黑" pitchFamily="34" charset="-122"/>
-              </a:rPr>
-              <a:t>Evaluation</a:t>
-            </a:r>
-            <a:endParaRPr lang="zh-CN" altLang="en-US" sz="2800" dirty="0">
-              <a:latin typeface="Impact" pitchFamily="34" charset="0"/>
-              <a:ea typeface="微软雅黑" pitchFamily="34" charset="-122"/>
-            </a:endParaRPr>
-          </a:p>
-        </p:txBody>
-      </p:sp>
-      <p:sp>
-        <p:nvSpPr>
-          <p:cNvPr id="17" name="Rectangle 16"/>
-          <p:cNvSpPr/>
-          <p:nvPr/>
-        </p:nvSpPr>
-        <p:spPr bwMode="auto">
-          <a:xfrm>
-            <a:off x="2771800" y="3907904"/>
-            <a:ext cx="457200" cy="457200"/>
-          </a:xfrm>
-          <a:prstGeom prst="rect">
-            <a:avLst/>
-          </a:prstGeom>
-          <a:solidFill>
-            <a:srgbClr val="FF0000"/>
-          </a:solidFill>
-          <a:ln w="9525" cap="flat" cmpd="sng" algn="ctr">
-            <a:noFill/>
-            <a:prstDash val="solid"/>
-            <a:round/>
-            <a:headEnd type="none" w="med" len="med"/>
-            <a:tailEnd type="none" w="med" len="med"/>
-          </a:ln>
-          <a:effectLst/>
-        </p:spPr>
-        <p:txBody>
-          <a:bodyPr vert="horz" wrap="none" lIns="91440" tIns="45720" rIns="91440" bIns="45720" numCol="1" rtlCol="0" anchor="ctr" anchorCtr="0" compatLnSpc="1">
-            <a:prstTxWarp prst="textNoShape">
-              <a:avLst/>
-            </a:prstTxWarp>
-          </a:bodyPr>
-          <a:lstStyle/>
-          <a:p>
-            <a:pPr marL="0" marR="0" indent="0" algn="ctr" defTabSz="914400" rtl="0" eaLnBrk="1" fontAlgn="base" latinLnBrk="0" hangingPunct="1">
-              <a:lnSpc>
-                <a:spcPct val="100000"/>
-              </a:lnSpc>
-              <a:spcBef>
-                <a:spcPct val="50000"/>
-              </a:spcBef>
-              <a:spcAft>
-                <a:spcPct val="0"/>
-              </a:spcAft>
-              <a:buClrTx/>
-              <a:buSzTx/>
-              <a:buFontTx/>
-              <a:buNone/>
-              <a:tabLst/>
-            </a:pPr>
-            <a:endParaRPr kumimoji="0" lang="zh-CN" altLang="en-US" sz="2800" b="0" i="0" u="none" strike="noStrike" cap="none" normalizeH="0" baseline="0" smtClean="0">
-              <a:ln>
-                <a:noFill/>
-              </a:ln>
-              <a:solidFill>
-                <a:srgbClr val="003300"/>
-              </a:solidFill>
-              <a:effectLst/>
-              <a:latin typeface="Times New Roman" pitchFamily="18" charset="0"/>
-              <a:ea typeface="幼圆" pitchFamily="49" charset="-122"/>
-            </a:endParaRPr>
-          </a:p>
-        </p:txBody>
-      </p:sp>
-      <p:cxnSp>
-        <p:nvCxnSpPr>
-          <p:cNvPr id="18" name="Straight Connector 17"/>
-          <p:cNvCxnSpPr/>
-          <p:nvPr/>
-        </p:nvCxnSpPr>
-        <p:spPr bwMode="auto">
-          <a:xfrm>
-            <a:off x="3144416" y="4339952"/>
-            <a:ext cx="2651720" cy="0"/>
-          </a:xfrm>
-          <a:prstGeom prst="line">
-            <a:avLst/>
-          </a:prstGeom>
-          <a:noFill/>
-          <a:ln w="9525" cap="flat" cmpd="sng" algn="ctr">
-            <a:solidFill>
-              <a:srgbClr val="FF0000"/>
-            </a:solidFill>
-            <a:prstDash val="solid"/>
-            <a:round/>
-            <a:headEnd type="none" w="med" len="med"/>
-            <a:tailEnd type="none" w="med" len="med"/>
-          </a:ln>
-          <a:effectLst/>
-        </p:spPr>
-      </p:cxnSp>
-      <p:sp>
-        <p:nvSpPr>
-          <p:cNvPr id="19" name="TextBox 18"/>
-          <p:cNvSpPr txBox="1"/>
-          <p:nvPr/>
-        </p:nvSpPr>
-        <p:spPr>
-          <a:xfrm>
-            <a:off x="3419872" y="3835896"/>
-            <a:ext cx="2088232" cy="584775"/>
-          </a:xfrm>
-          <a:prstGeom prst="rect">
-            <a:avLst/>
-          </a:prstGeom>
-          <a:noFill/>
-        </p:spPr>
-        <p:txBody>
-          <a:bodyPr wrap="square" rtlCol="0">
-            <a:spAutoFit/>
-          </a:bodyPr>
-          <a:lstStyle/>
-          <a:p>
-            <a:pPr algn="l"/>
-            <a:r>
-              <a:rPr lang="en-US" altLang="zh-CN" sz="3200" dirty="0" smtClean="0">
-                <a:solidFill>
-                  <a:schemeClr val="tx1"/>
-                </a:solidFill>
-                <a:latin typeface="Impact" pitchFamily="34" charset="0"/>
-                <a:ea typeface="微软雅黑" pitchFamily="34" charset="-122"/>
-              </a:rPr>
-              <a:t>Conclusion</a:t>
-            </a:r>
-            <a:endParaRPr lang="zh-CN" altLang="en-US" sz="3200" dirty="0" smtClean="0">
-              <a:solidFill>
-                <a:schemeClr val="tx1"/>
-              </a:solidFill>
-              <a:latin typeface="Impact" pitchFamily="34" charset="0"/>
-              <a:ea typeface="微软雅黑" pitchFamily="34" charset="-122"/>
-            </a:endParaRPr>
-          </a:p>
-        </p:txBody>
-      </p:sp>
-    </p:spTree>
-  </p:cSld>
-  <p:clrMapOvr>
-    <a:masterClrMapping/>
-  </p:clrMapOvr>
-  <p:transition/>
-</p:sld>
-</file>
-
-<file path=ppt/slides/slide3.xml><?xml version="1.0" encoding="utf-8"?>
-<p:sld xmlns:a="http://schemas.openxmlformats.org/drawingml/2006/main" xmlns:r="http://schemas.openxmlformats.org/officeDocument/2006/relationships" xmlns:p="http://schemas.openxmlformats.org/presentationml/2006/main">
-  <p:cSld>
-    <p:bg>
-      <p:bgPr>
-        <a:blipFill dpi="0" rotWithShape="1">
-          <a:blip r:embed="rId2" cstate="print">
-            <a:alphaModFix amt="20000"/>
-            <a:lum/>
-          </a:blip>
-          <a:srcRect/>
-          <a:stretch>
-            <a:fillRect t="-9000"/>
-          </a:stretch>
-        </a:blipFill>
-        <a:effectLst/>
-      </p:bgPr>
-    </p:bg>
-    <p:spTree>
-      <p:nvGrpSpPr>
-        <p:cNvPr id="1" name=""/>
-        <p:cNvGrpSpPr/>
-        <p:nvPr/>
-      </p:nvGrpSpPr>
-      <p:grpSpPr>
-        <a:xfrm>
-          <a:off x="0" y="0"/>
-          <a:ext cx="0" cy="0"/>
-          <a:chOff x="0" y="0"/>
-          <a:chExt cx="0" cy="0"/>
-        </a:xfrm>
-      </p:grpSpPr>
-      <p:sp>
-        <p:nvSpPr>
-          <p:cNvPr id="2" name="Title 1"/>
+          <p:cNvPr id="227331" name="Rectangle 3"/>
           <p:cNvSpPr>
-            <a:spLocks noGrp="1"/>
+            <a:spLocks noGrp="1" noChangeArrowheads="1"/>
           </p:cNvSpPr>
           <p:nvPr>
-            <p:ph type="title"/>
+            <p:ph type="body" idx="1"/>
           </p:nvPr>
         </p:nvSpPr>
         <p:spPr/>
@@ -4464,520 +3795,33 @@
           <a:lstStyle/>
           <a:p>
             <a:r>
-              <a:rPr lang="en-US" altLang="zh-CN" dirty="0" smtClean="0">
-                <a:latin typeface="Impact" pitchFamily="34" charset="0"/>
-              </a:rPr>
-              <a:t>Background</a:t>
-            </a:r>
-            <a:endParaRPr lang="zh-CN" altLang="en-US" dirty="0">
-              <a:latin typeface="Impact" pitchFamily="34" charset="0"/>
-            </a:endParaRPr>
-          </a:p>
-        </p:txBody>
-      </p:sp>
-      <p:sp>
-        <p:nvSpPr>
-          <p:cNvPr id="3" name="Content Placeholder 2"/>
-          <p:cNvSpPr>
-            <a:spLocks noGrp="1"/>
-          </p:cNvSpPr>
-          <p:nvPr>
-            <p:ph idx="1"/>
-          </p:nvPr>
-        </p:nvSpPr>
-        <p:spPr/>
-        <p:txBody>
-          <a:bodyPr/>
-          <a:lstStyle/>
-          <a:p>
-            <a:r>
               <a:rPr lang="en-US" altLang="zh-CN" dirty="0" smtClean="0"/>
-              <a:t>Flow management over Internet</a:t>
-            </a:r>
-          </a:p>
-          <a:p>
-            <a:pPr lvl="1"/>
+              <a:t>Designed at Aug. 2, 2010 by </a:t>
+            </a:r>
+            <a:r>
+              <a:rPr lang="en-US" altLang="zh-CN" dirty="0" err="1" smtClean="0"/>
+              <a:t>Baohua</a:t>
+            </a:r>
             <a:r>
               <a:rPr lang="en-US" altLang="zh-CN" dirty="0" smtClean="0"/>
-              <a:t>Decades long efforts</a:t>
-            </a:r>
-          </a:p>
-          <a:p>
-            <a:pPr lvl="2"/>
+              <a:t> Yang</a:t>
+            </a:r>
+          </a:p>
+          <a:p>
             <a:r>
               <a:rPr lang="en-US" altLang="zh-CN" dirty="0" smtClean="0"/>
-              <a:t>Latency,  bandwidth</a:t>
-            </a:r>
-          </a:p>
-          <a:p>
-            <a:pPr lvl="2"/>
+              <a:t>All rights are reserved by NSLAB</a:t>
+            </a:r>
+          </a:p>
+          <a:p>
+            <a:r>
+              <a:rPr lang="en-US" altLang="zh-CN" dirty="0" err="1" smtClean="0"/>
+              <a:t>Blabla</a:t>
+            </a:r>
             <a:r>
               <a:rPr lang="en-US" altLang="zh-CN" dirty="0" smtClean="0"/>
-              <a:t>Congestion avoiding</a:t>
-            </a:r>
-          </a:p>
-          <a:p>
-            <a:pPr lvl="1"/>
-            <a:r>
-              <a:rPr lang="en-US" altLang="zh-CN" dirty="0" smtClean="0"/>
-              <a:t>Focus on problems over Internet</a:t>
-            </a:r>
-          </a:p>
-          <a:p>
-            <a:pPr lvl="1"/>
-            <a:r>
-              <a:rPr lang="en-US" altLang="zh-CN" dirty="0" smtClean="0"/>
-              <a:t>Two main challenges</a:t>
-            </a:r>
-          </a:p>
-          <a:p>
-            <a:pPr lvl="2"/>
-            <a:r>
-              <a:rPr lang="en-US" altLang="zh-CN" dirty="0" smtClean="0"/>
-              <a:t>Precious Modeling is difficult to give</a:t>
-            </a:r>
-          </a:p>
-          <a:p>
-            <a:pPr lvl="2"/>
-            <a:r>
-              <a:rPr lang="en-US" altLang="zh-CN" dirty="0" smtClean="0"/>
-              <a:t>No perfect experimental platform</a:t>
-            </a:r>
-          </a:p>
-          <a:p>
-            <a:pPr lvl="1"/>
-            <a:r>
-              <a:rPr lang="en-US" altLang="zh-CN" dirty="0" smtClean="0"/>
-              <a:t>Effective flow management is still lacking</a:t>
-            </a:r>
-            <a:endParaRPr lang="zh-CN" altLang="en-US" dirty="0"/>
-          </a:p>
-        </p:txBody>
-      </p:sp>
-    </p:spTree>
-  </p:cSld>
-  <p:clrMapOvr>
-    <a:masterClrMapping/>
-  </p:clrMapOvr>
-  <p:transition/>
-  <p:timing>
-    <p:tnLst>
-      <p:par>
-        <p:cTn id="1" dur="indefinite" restart="never" nodeType="tmRoot"/>
-      </p:par>
-    </p:tnLst>
-  </p:timing>
-</p:sld>
-</file>
-
-<file path=ppt/slides/slide4.xml><?xml version="1.0" encoding="utf-8"?>
-<p:sld xmlns:a="http://schemas.openxmlformats.org/drawingml/2006/main" xmlns:r="http://schemas.openxmlformats.org/officeDocument/2006/relationships" xmlns:p="http://schemas.openxmlformats.org/presentationml/2006/main">
-  <p:cSld>
-    <p:spTree>
-      <p:nvGrpSpPr>
-        <p:cNvPr id="1" name=""/>
-        <p:cNvGrpSpPr/>
-        <p:nvPr/>
-      </p:nvGrpSpPr>
-      <p:grpSpPr>
-        <a:xfrm>
-          <a:off x="0" y="0"/>
-          <a:ext cx="0" cy="0"/>
-          <a:chOff x="0" y="0"/>
-          <a:chExt cx="0" cy="0"/>
-        </a:xfrm>
-      </p:grpSpPr>
-      <p:sp>
-        <p:nvSpPr>
-          <p:cNvPr id="2" name="Title 1"/>
-          <p:cNvSpPr>
-            <a:spLocks noGrp="1"/>
-          </p:cNvSpPr>
-          <p:nvPr>
-            <p:ph type="ctrTitle" sz="quarter"/>
-          </p:nvPr>
-        </p:nvSpPr>
-        <p:spPr/>
-        <p:txBody>
-          <a:bodyPr>
-            <a:noAutofit/>
-          </a:bodyPr>
-          <a:lstStyle/>
-          <a:p>
-            <a:r>
-              <a:rPr lang="en-US" altLang="zh-CN" i="1" dirty="0" err="1" smtClean="0">
-                <a:solidFill>
-                  <a:schemeClr val="tx1"/>
-                </a:solidFill>
-              </a:rPr>
-              <a:t>NSLab</a:t>
-            </a:r>
-            <a:r>
-              <a:rPr lang="en-US" altLang="zh-CN" i="1" dirty="0" smtClean="0">
-                <a:solidFill>
-                  <a:schemeClr val="tx1"/>
-                </a:solidFill>
-              </a:rPr>
-              <a:t>: </a:t>
-            </a:r>
-            <a:r>
-              <a:rPr lang="en-US" altLang="zh-CN" sz="3200" dirty="0" smtClean="0">
-                <a:solidFill>
-                  <a:schemeClr val="tx1"/>
-                </a:solidFill>
-              </a:rPr>
-              <a:t>Network Security Laboratory of </a:t>
-            </a:r>
-            <a:r>
-              <a:rPr lang="en-US" altLang="zh-CN" sz="3200" dirty="0" err="1" smtClean="0">
-                <a:solidFill>
-                  <a:schemeClr val="tx1"/>
-                </a:solidFill>
-              </a:rPr>
-              <a:t>Tsinghua</a:t>
-            </a:r>
-            <a:r>
-              <a:rPr lang="en-US" altLang="zh-CN" sz="3200" dirty="0" smtClean="0">
-                <a:solidFill>
-                  <a:schemeClr val="tx1"/>
-                </a:solidFill>
-              </a:rPr>
-              <a:t> University</a:t>
-            </a:r>
-            <a:endParaRPr lang="en-US" sz="3200" dirty="0">
-              <a:solidFill>
-                <a:schemeClr val="tx1"/>
-              </a:solidFill>
-            </a:endParaRPr>
-          </a:p>
-        </p:txBody>
-      </p:sp>
-      <p:sp>
-        <p:nvSpPr>
-          <p:cNvPr id="3" name="TextBox 2"/>
-          <p:cNvSpPr txBox="1"/>
-          <p:nvPr/>
-        </p:nvSpPr>
-        <p:spPr>
-          <a:xfrm>
-            <a:off x="6732240" y="4757082"/>
-            <a:ext cx="2088232" cy="523220"/>
-          </a:xfrm>
-          <a:prstGeom prst="rect">
-            <a:avLst/>
-          </a:prstGeom>
-          <a:noFill/>
-        </p:spPr>
-        <p:txBody>
-          <a:bodyPr wrap="square" rtlCol="0">
-            <a:spAutoFit/>
-          </a:bodyPr>
-          <a:lstStyle/>
-          <a:p>
-            <a:r>
-              <a:rPr lang="en-US" sz="2800" i="1" dirty="0" smtClean="0">
-                <a:solidFill>
-                  <a:schemeClr val="tx1">
-                    <a:lumMod val="50000"/>
-                    <a:lumOff val="50000"/>
-                  </a:schemeClr>
-                </a:solidFill>
-              </a:rPr>
-              <a:t>presenter</a:t>
-            </a:r>
-            <a:endParaRPr lang="en-US" sz="2800" i="1" dirty="0">
-              <a:solidFill>
-                <a:schemeClr val="tx1">
-                  <a:lumMod val="50000"/>
-                  <a:lumOff val="50000"/>
-                </a:schemeClr>
-              </a:solidFill>
-            </a:endParaRPr>
-          </a:p>
-        </p:txBody>
-      </p:sp>
-      <p:sp>
-        <p:nvSpPr>
-          <p:cNvPr id="4" name="TextBox 3"/>
-          <p:cNvSpPr txBox="1"/>
-          <p:nvPr/>
-        </p:nvSpPr>
-        <p:spPr>
-          <a:xfrm>
-            <a:off x="6588224" y="5405154"/>
-            <a:ext cx="2241319" cy="400110"/>
-          </a:xfrm>
-          <a:prstGeom prst="rect">
-            <a:avLst/>
-          </a:prstGeom>
-          <a:noFill/>
-        </p:spPr>
-        <p:txBody>
-          <a:bodyPr wrap="none" rtlCol="0">
-            <a:spAutoFit/>
-          </a:bodyPr>
-          <a:lstStyle/>
-          <a:p>
-            <a:fld id="{5CAE7B12-CD40-4AAA-96A7-8F6CB2CD0ACE}" type="datetime4">
-              <a:rPr lang="en-US" sz="2000" smtClean="0">
-                <a:solidFill>
-                  <a:schemeClr val="tx1">
-                    <a:lumMod val="50000"/>
-                    <a:lumOff val="50000"/>
-                  </a:schemeClr>
-                </a:solidFill>
-              </a:rPr>
-              <a:pPr/>
-              <a:t>September 23, 2010</a:t>
-            </a:fld>
-            <a:endParaRPr lang="en-US" dirty="0">
-              <a:solidFill>
-                <a:schemeClr val="tx1">
-                  <a:lumMod val="50000"/>
-                  <a:lumOff val="50000"/>
-                </a:schemeClr>
-              </a:solidFill>
-            </a:endParaRPr>
-          </a:p>
-        </p:txBody>
-      </p:sp>
-      <p:sp>
-        <p:nvSpPr>
-          <p:cNvPr id="5" name="Title 1"/>
-          <p:cNvSpPr txBox="1">
-            <a:spLocks/>
-          </p:cNvSpPr>
-          <p:nvPr/>
-        </p:nvSpPr>
-        <p:spPr bwMode="auto">
-          <a:xfrm>
-            <a:off x="1259632" y="3068960"/>
-            <a:ext cx="6912768" cy="430887"/>
-          </a:xfrm>
-          <a:prstGeom prst="rect">
-            <a:avLst/>
-          </a:prstGeom>
-          <a:noFill/>
-          <a:ln w="76200">
-            <a:noFill/>
-            <a:miter lim="800000"/>
-            <a:headEnd/>
-            <a:tailEnd/>
-          </a:ln>
-          <a:effectLst/>
-        </p:spPr>
-        <p:txBody>
-          <a:bodyPr vert="horz" wrap="square" lIns="91440" tIns="45720" rIns="91440" bIns="45720" numCol="1" anchor="ctr" anchorCtr="0" compatLnSpc="1">
-            <a:prstTxWarp prst="textNoShape">
-              <a:avLst/>
-            </a:prstTxWarp>
-            <a:normAutofit/>
-          </a:bodyPr>
-          <a:lstStyle/>
-          <a:p>
-            <a:pPr marL="0" marR="0" lvl="0" indent="0" algn="ctr" defTabSz="914400" rtl="0" eaLnBrk="1" fontAlgn="base" latinLnBrk="0" hangingPunct="1">
-              <a:lnSpc>
-                <a:spcPct val="100000"/>
-              </a:lnSpc>
-              <a:spcBef>
-                <a:spcPct val="0"/>
-              </a:spcBef>
-              <a:spcAft>
-                <a:spcPct val="0"/>
-              </a:spcAft>
-              <a:buClrTx/>
-              <a:buSzTx/>
-              <a:buFontTx/>
-              <a:buNone/>
-              <a:tabLst/>
-              <a:defRPr/>
-            </a:pPr>
-            <a:r>
-              <a:rPr kumimoji="0" lang="en-US" altLang="zh-CN" sz="2200" u="none" strike="noStrike" kern="0" cap="none" spc="0" normalizeH="0" baseline="0" noProof="0" dirty="0" smtClean="0">
-                <a:ln>
-                  <a:noFill/>
-                </a:ln>
-                <a:solidFill>
-                  <a:schemeClr val="tx1">
-                    <a:lumMod val="65000"/>
-                    <a:lumOff val="35000"/>
-                  </a:schemeClr>
-                </a:solidFill>
-                <a:effectLst/>
-                <a:uLnTx/>
-                <a:uFillTx/>
-                <a:latin typeface="+mn-lt"/>
-                <a:ea typeface="黑体" pitchFamily="49" charset="-122"/>
-                <a:cs typeface="David" pitchFamily="34" charset="-79"/>
-              </a:rPr>
-              <a:t>Authors name here</a:t>
-            </a:r>
-            <a:endParaRPr kumimoji="0" lang="en-US" sz="2200" u="none" strike="noStrike" kern="0" cap="none" spc="0" normalizeH="0" baseline="0" noProof="0" dirty="0">
-              <a:ln>
-                <a:noFill/>
-              </a:ln>
-              <a:solidFill>
-                <a:schemeClr val="tx1">
-                  <a:lumMod val="65000"/>
-                  <a:lumOff val="35000"/>
-                </a:schemeClr>
-              </a:solidFill>
-              <a:effectLst/>
-              <a:uLnTx/>
-              <a:uFillTx/>
-              <a:latin typeface="+mn-lt"/>
-              <a:ea typeface="黑体" pitchFamily="49" charset="-122"/>
-              <a:cs typeface="David" pitchFamily="34" charset="-79"/>
-            </a:endParaRPr>
-          </a:p>
-        </p:txBody>
-      </p:sp>
-      <p:sp>
-        <p:nvSpPr>
-          <p:cNvPr id="6" name="Rectangle 5"/>
-          <p:cNvSpPr/>
-          <p:nvPr/>
-        </p:nvSpPr>
-        <p:spPr bwMode="auto">
-          <a:xfrm>
-            <a:off x="0" y="0"/>
-            <a:ext cx="9144000" cy="6858000"/>
-          </a:xfrm>
-          <a:prstGeom prst="rect">
-            <a:avLst/>
-          </a:prstGeom>
-          <a:solidFill>
-            <a:schemeClr val="bg1">
-              <a:alpha val="59000"/>
-            </a:schemeClr>
-          </a:solidFill>
-          <a:ln w="9525" cap="flat" cmpd="sng" algn="ctr">
-            <a:solidFill>
-              <a:schemeClr val="tx2"/>
-            </a:solidFill>
-            <a:prstDash val="solid"/>
-            <a:round/>
-            <a:headEnd type="none" w="med" len="med"/>
-            <a:tailEnd type="none" w="med" len="med"/>
-          </a:ln>
-          <a:effectLst/>
-        </p:spPr>
-        <p:txBody>
-          <a:bodyPr vert="horz" wrap="none" lIns="91440" tIns="45720" rIns="91440" bIns="45720" numCol="1" rtlCol="0" anchor="ctr" anchorCtr="0" compatLnSpc="1">
-            <a:prstTxWarp prst="textNoShape">
-              <a:avLst/>
-            </a:prstTxWarp>
-          </a:bodyPr>
-          <a:lstStyle/>
-          <a:p>
-            <a:pPr marL="0" marR="0" indent="0" algn="ctr" defTabSz="914400" rtl="0" eaLnBrk="1" fontAlgn="base" latinLnBrk="0" hangingPunct="1">
-              <a:lnSpc>
-                <a:spcPct val="100000"/>
-              </a:lnSpc>
-              <a:spcBef>
-                <a:spcPct val="50000"/>
-              </a:spcBef>
-              <a:spcAft>
-                <a:spcPct val="0"/>
-              </a:spcAft>
-              <a:buClrTx/>
-              <a:buSzTx/>
-              <a:buFontTx/>
-              <a:buNone/>
-              <a:tabLst/>
-            </a:pPr>
-            <a:endParaRPr kumimoji="0" lang="zh-CN" altLang="en-US" sz="2400" b="0" i="0" u="none" strike="noStrike" cap="none" normalizeH="0" baseline="0" dirty="0" smtClean="0">
-              <a:ln>
-                <a:noFill/>
-              </a:ln>
-              <a:solidFill>
-                <a:srgbClr val="003300"/>
-              </a:solidFill>
-              <a:effectLst/>
-              <a:latin typeface="Times New Roman" pitchFamily="18" charset="0"/>
-              <a:ea typeface="幼圆" pitchFamily="49" charset="-122"/>
-            </a:endParaRPr>
-          </a:p>
-        </p:txBody>
-      </p:sp>
-      <p:sp>
-        <p:nvSpPr>
-          <p:cNvPr id="7" name="Rectangle 6"/>
-          <p:cNvSpPr/>
-          <p:nvPr/>
-        </p:nvSpPr>
-        <p:spPr bwMode="auto">
-          <a:xfrm>
-            <a:off x="-36512" y="1412776"/>
-            <a:ext cx="9180512" cy="2160240"/>
-          </a:xfrm>
-          <a:prstGeom prst="rect">
-            <a:avLst/>
-          </a:prstGeom>
-          <a:solidFill>
-            <a:schemeClr val="accent6">
-              <a:lumMod val="40000"/>
-              <a:lumOff val="60000"/>
-            </a:schemeClr>
-          </a:solidFill>
-          <a:ln w="9525" cap="flat" cmpd="sng" algn="ctr">
-            <a:noFill/>
-            <a:prstDash val="solid"/>
-            <a:round/>
-            <a:headEnd type="none" w="med" len="med"/>
-            <a:tailEnd type="none" w="med" len="med"/>
-          </a:ln>
-          <a:effectLst/>
-        </p:spPr>
-        <p:txBody>
-          <a:bodyPr vert="horz" wrap="none" lIns="91440" tIns="45720" rIns="91440" bIns="45720" numCol="1" rtlCol="0" anchor="ctr" anchorCtr="0" compatLnSpc="1">
-            <a:prstTxWarp prst="textNoShape">
-              <a:avLst/>
-            </a:prstTxWarp>
-          </a:bodyPr>
-          <a:lstStyle/>
-          <a:p>
-            <a:r>
-              <a:rPr lang="en-US" altLang="zh-CN" sz="4800" dirty="0" smtClean="0">
-                <a:solidFill>
-                  <a:schemeClr val="tx1"/>
-                </a:solidFill>
-                <a:latin typeface="Comic Sans MS" pitchFamily="66" charset="0"/>
-              </a:rPr>
-              <a:t>Thanks for the participation!</a:t>
-            </a:r>
-          </a:p>
-          <a:p>
-            <a:r>
-              <a:rPr lang="en-US" altLang="zh-CN" dirty="0" smtClean="0">
-                <a:solidFill>
-                  <a:schemeClr val="tx1"/>
-                </a:solidFill>
-                <a:latin typeface="Comic Sans MS" pitchFamily="66" charset="0"/>
-              </a:rPr>
-              <a:t>Any question, feel free to contact </a:t>
-            </a:r>
-          </a:p>
-          <a:p>
-            <a:r>
-              <a:rPr lang="en-US" altLang="zh-CN" dirty="0" smtClean="0">
-                <a:solidFill>
-                  <a:srgbClr val="0000FF"/>
-                </a:solidFill>
-                <a:latin typeface="Comic Sans MS" pitchFamily="66" charset="0"/>
-              </a:rPr>
-              <a:t>Author (author@nslab.tsinghua)</a:t>
-            </a:r>
-            <a:endParaRPr kumimoji="0" lang="zh-CN" altLang="en-US" sz="2400" b="0" i="0" u="none" strike="noStrike" cap="none" normalizeH="0" baseline="0" dirty="0" smtClean="0">
-              <a:ln>
-                <a:noFill/>
-              </a:ln>
-              <a:solidFill>
-                <a:srgbClr val="0000FF"/>
-              </a:solidFill>
-              <a:effectLst/>
-              <a:latin typeface="Comic Sans MS" pitchFamily="66" charset="0"/>
-            </a:endParaRPr>
+              <a:t>…</a:t>
+            </a:r>
           </a:p>
         </p:txBody>
       </p:sp>

</xml_diff>